<commit_message>
some folders were removed
</commit_message>
<xml_diff>
--- a/presentation/Xilinx IP cores for Digital Signal Processing.pptx
+++ b/presentation/Xilinx IP cores for Digital Signal Processing.pptx
@@ -5631,7 +5631,7 @@
         <a:p>
           <a:r>
             <a:rPr lang="en-US" dirty="0" smtClean="0"/>
-            <a:t>FFT + Windowing</a:t>
+            <a:t>FFT</a:t>
           </a:r>
           <a:endParaRPr lang="ru-RU" dirty="0"/>
         </a:p>
@@ -5668,7 +5668,7 @@
         <a:p>
           <a:r>
             <a:rPr lang="en-US" dirty="0" smtClean="0"/>
-            <a:t>IFFT + Windowing</a:t>
+            <a:t>IFFT</a:t>
           </a:r>
           <a:endParaRPr lang="ru-RU" dirty="0"/>
         </a:p>
@@ -8257,11 +8257,7 @@
         <a:p>
           <a:r>
             <a:rPr lang="en-US" dirty="0" smtClean="0"/>
-            <a:t>RTL Testbench </a:t>
-          </a:r>
-          <a:r>
-            <a:rPr lang="en-US" dirty="0" smtClean="0"/>
-            <a:t>(</a:t>
+            <a:t>RTL Testbench (</a:t>
           </a:r>
           <a:r>
             <a:rPr lang="de-DE" dirty="0" err="1" smtClean="0"/>
@@ -8269,11 +8265,7 @@
           </a:r>
           <a:r>
             <a:rPr lang="en-US" dirty="0" smtClean="0"/>
-            <a:t>.v</a:t>
-          </a:r>
-          <a:r>
-            <a:rPr lang="en-US" dirty="0" smtClean="0"/>
-            <a:t>)</a:t>
+            <a:t>.v)</a:t>
           </a:r>
           <a:endParaRPr lang="ru-RU" dirty="0"/>
         </a:p>
@@ -8623,11 +8615,7 @@
         <a:p>
           <a:r>
             <a:rPr lang="en-US" dirty="0" smtClean="0"/>
-            <a:t>RTL Testbench </a:t>
-          </a:r>
-          <a:r>
-            <a:rPr lang="en-US" dirty="0" smtClean="0"/>
-            <a:t>(</a:t>
+            <a:t>RTL Testbench (</a:t>
           </a:r>
           <a:r>
             <a:rPr lang="de-DE" dirty="0" err="1" smtClean="0"/>
@@ -8635,11 +8623,7 @@
           </a:r>
           <a:r>
             <a:rPr lang="en-US" dirty="0" smtClean="0"/>
-            <a:t>.v</a:t>
-          </a:r>
-          <a:r>
-            <a:rPr lang="en-US" dirty="0" smtClean="0"/>
-            <a:t>)</a:t>
+            <a:t>.v)</a:t>
           </a:r>
           <a:endParaRPr lang="ru-RU" dirty="0"/>
         </a:p>
@@ -11262,7 +11246,7 @@
           </a:pPr>
           <a:r>
             <a:rPr lang="en-US" sz="1200" kern="1200" dirty="0" smtClean="0"/>
-            <a:t>FFT + Windowing</a:t>
+            <a:t>FFT</a:t>
           </a:r>
           <a:endParaRPr lang="ru-RU" sz="1200" kern="1200" dirty="0"/>
         </a:p>
@@ -11435,7 +11419,7 @@
           </a:pPr>
           <a:r>
             <a:rPr lang="en-US" sz="1200" kern="1200" dirty="0" smtClean="0"/>
-            <a:t>IFFT + Windowing</a:t>
+            <a:t>IFFT</a:t>
           </a:r>
           <a:endParaRPr lang="ru-RU" sz="1200" kern="1200" dirty="0"/>
         </a:p>
@@ -14924,11 +14908,7 @@
           </a:pPr>
           <a:r>
             <a:rPr lang="en-US" sz="1100" kern="1200" dirty="0" smtClean="0"/>
-            <a:t>RTL Testbench </a:t>
-          </a:r>
-          <a:r>
-            <a:rPr lang="en-US" sz="1100" kern="1200" dirty="0" smtClean="0"/>
-            <a:t>(</a:t>
+            <a:t>RTL Testbench (</a:t>
           </a:r>
           <a:r>
             <a:rPr lang="de-DE" sz="1100" kern="1200" dirty="0" err="1" smtClean="0"/>
@@ -14936,11 +14916,7 @@
           </a:r>
           <a:r>
             <a:rPr lang="en-US" sz="1100" kern="1200" dirty="0" smtClean="0"/>
-            <a:t>.v</a:t>
-          </a:r>
-          <a:r>
-            <a:rPr lang="en-US" sz="1100" kern="1200" dirty="0" smtClean="0"/>
-            <a:t>)</a:t>
+            <a:t>.v)</a:t>
           </a:r>
           <a:endParaRPr lang="ru-RU" sz="1100" kern="1200" dirty="0"/>
         </a:p>
@@ -15407,11 +15383,7 @@
           </a:pPr>
           <a:r>
             <a:rPr lang="en-US" sz="1100" kern="1200" dirty="0" smtClean="0"/>
-            <a:t>RTL Testbench </a:t>
-          </a:r>
-          <a:r>
-            <a:rPr lang="en-US" sz="1100" kern="1200" dirty="0" smtClean="0"/>
-            <a:t>(</a:t>
+            <a:t>RTL Testbench (</a:t>
           </a:r>
           <a:r>
             <a:rPr lang="de-DE" sz="1100" kern="1200" dirty="0" err="1" smtClean="0"/>
@@ -15419,11 +15391,7 @@
           </a:r>
           <a:r>
             <a:rPr lang="en-US" sz="1100" kern="1200" dirty="0" smtClean="0"/>
-            <a:t>.v</a:t>
-          </a:r>
-          <a:r>
-            <a:rPr lang="en-US" sz="1100" kern="1200" dirty="0" smtClean="0"/>
-            <a:t>)</a:t>
+            <a:t>.v)</a:t>
           </a:r>
           <a:endParaRPr lang="ru-RU" sz="1100" kern="1200" dirty="0"/>
         </a:p>
@@ -29853,7 +29821,7 @@
           <a:p>
             <a:fld id="{D09D8D34-2EBD-4B97-B36B-987099F6080A}" type="datetimeFigureOut">
               <a:rPr lang="ru-RU" smtClean="0"/>
-              <a:t>23.03.2022</a:t>
+              <a:t>02.04.2022</a:t>
             </a:fld>
             <a:endParaRPr lang="ru-RU"/>
           </a:p>
@@ -30023,7 +29991,7 @@
           <a:p>
             <a:fld id="{D09D8D34-2EBD-4B97-B36B-987099F6080A}" type="datetimeFigureOut">
               <a:rPr lang="ru-RU" smtClean="0"/>
-              <a:t>23.03.2022</a:t>
+              <a:t>02.04.2022</a:t>
             </a:fld>
             <a:endParaRPr lang="ru-RU"/>
           </a:p>
@@ -30203,7 +30171,7 @@
           <a:p>
             <a:fld id="{D09D8D34-2EBD-4B97-B36B-987099F6080A}" type="datetimeFigureOut">
               <a:rPr lang="ru-RU" smtClean="0"/>
-              <a:t>23.03.2022</a:t>
+              <a:t>02.04.2022</a:t>
             </a:fld>
             <a:endParaRPr lang="ru-RU"/>
           </a:p>
@@ -30373,7 +30341,7 @@
           <a:p>
             <a:fld id="{D09D8D34-2EBD-4B97-B36B-987099F6080A}" type="datetimeFigureOut">
               <a:rPr lang="ru-RU" smtClean="0"/>
-              <a:t>23.03.2022</a:t>
+              <a:t>02.04.2022</a:t>
             </a:fld>
             <a:endParaRPr lang="ru-RU"/>
           </a:p>
@@ -30619,7 +30587,7 @@
           <a:p>
             <a:fld id="{D09D8D34-2EBD-4B97-B36B-987099F6080A}" type="datetimeFigureOut">
               <a:rPr lang="ru-RU" smtClean="0"/>
-              <a:t>23.03.2022</a:t>
+              <a:t>02.04.2022</a:t>
             </a:fld>
             <a:endParaRPr lang="ru-RU"/>
           </a:p>
@@ -30851,7 +30819,7 @@
           <a:p>
             <a:fld id="{D09D8D34-2EBD-4B97-B36B-987099F6080A}" type="datetimeFigureOut">
               <a:rPr lang="ru-RU" smtClean="0"/>
-              <a:t>23.03.2022</a:t>
+              <a:t>02.04.2022</a:t>
             </a:fld>
             <a:endParaRPr lang="ru-RU"/>
           </a:p>
@@ -31218,7 +31186,7 @@
           <a:p>
             <a:fld id="{D09D8D34-2EBD-4B97-B36B-987099F6080A}" type="datetimeFigureOut">
               <a:rPr lang="ru-RU" smtClean="0"/>
-              <a:t>23.03.2022</a:t>
+              <a:t>02.04.2022</a:t>
             </a:fld>
             <a:endParaRPr lang="ru-RU"/>
           </a:p>
@@ -31336,7 +31304,7 @@
           <a:p>
             <a:fld id="{D09D8D34-2EBD-4B97-B36B-987099F6080A}" type="datetimeFigureOut">
               <a:rPr lang="ru-RU" smtClean="0"/>
-              <a:t>23.03.2022</a:t>
+              <a:t>02.04.2022</a:t>
             </a:fld>
             <a:endParaRPr lang="ru-RU"/>
           </a:p>
@@ -31431,7 +31399,7 @@
           <a:p>
             <a:fld id="{D09D8D34-2EBD-4B97-B36B-987099F6080A}" type="datetimeFigureOut">
               <a:rPr lang="ru-RU" smtClean="0"/>
-              <a:t>23.03.2022</a:t>
+              <a:t>02.04.2022</a:t>
             </a:fld>
             <a:endParaRPr lang="ru-RU"/>
           </a:p>
@@ -31708,7 +31676,7 @@
           <a:p>
             <a:fld id="{D09D8D34-2EBD-4B97-B36B-987099F6080A}" type="datetimeFigureOut">
               <a:rPr lang="ru-RU" smtClean="0"/>
-              <a:t>23.03.2022</a:t>
+              <a:t>02.04.2022</a:t>
             </a:fld>
             <a:endParaRPr lang="ru-RU"/>
           </a:p>
@@ -31961,7 +31929,7 @@
           <a:p>
             <a:fld id="{D09D8D34-2EBD-4B97-B36B-987099F6080A}" type="datetimeFigureOut">
               <a:rPr lang="ru-RU" smtClean="0"/>
-              <a:t>23.03.2022</a:t>
+              <a:t>02.04.2022</a:t>
             </a:fld>
             <a:endParaRPr lang="ru-RU"/>
           </a:p>
@@ -32174,7 +32142,7 @@
           <a:p>
             <a:fld id="{D09D8D34-2EBD-4B97-B36B-987099F6080A}" type="datetimeFigureOut">
               <a:rPr lang="ru-RU" smtClean="0"/>
-              <a:t>23.03.2022</a:t>
+              <a:t>02.04.2022</a:t>
             </a:fld>
             <a:endParaRPr lang="ru-RU"/>
           </a:p>
@@ -32591,21 +32559,25 @@
         </p:nvSpPr>
         <p:spPr>
           <a:xfrm>
-            <a:off x="1492195" y="1798223"/>
-            <a:ext cx="9144000" cy="2387600"/>
+            <a:off x="1539903" y="2019631"/>
+            <a:ext cx="9144000" cy="1299500"/>
           </a:xfrm>
         </p:spPr>
         <p:txBody>
           <a:bodyPr>
-            <a:normAutofit fontScale="90000"/>
+            <a:noAutofit/>
           </a:bodyPr>
           <a:lstStyle/>
           <a:p>
             <a:r>
-              <a:rPr lang="en-US" dirty="0" smtClean="0"/>
+              <a:rPr lang="en-US" sz="4000" dirty="0" smtClean="0">
+                <a:latin typeface="+mn-lt"/>
+              </a:rPr>
               <a:t>Xilinx IP cores for Digital Signal Processing: modelling and RTL simulation</a:t>
             </a:r>
-            <a:endParaRPr lang="ru-RU" dirty="0"/>
+            <a:endParaRPr lang="ru-RU" sz="4000" dirty="0">
+              <a:latin typeface="+mn-lt"/>
+            </a:endParaRPr>
           </a:p>
         </p:txBody>
       </p:sp>
@@ -32725,7 +32697,7 @@
           <p:nvPr>
             <p:extLst>
               <p:ext uri="{D42A27DB-BD31-4B8C-83A1-F6EECF244321}">
-                <p14:modId xmlns:p14="http://schemas.microsoft.com/office/powerpoint/2010/main" val="2380635045"/>
+                <p14:modId xmlns:p14="http://schemas.microsoft.com/office/powerpoint/2010/main" val="3759436222"/>
               </p:ext>
             </p:extLst>
           </p:nvPr>
@@ -34501,15 +34473,7 @@
             <a:pPr algn="ctr"/>
             <a:r>
               <a:rPr lang="en-US" sz="1400" dirty="0" smtClean="0"/>
-              <a:t>Testbench for </a:t>
-            </a:r>
-            <a:r>
-              <a:rPr lang="en-US" sz="1400" dirty="0" smtClean="0"/>
-              <a:t>Decimator and Interpolator with </a:t>
-            </a:r>
-            <a:r>
-              <a:rPr lang="en-US" sz="1400" dirty="0" smtClean="0"/>
-              <a:t>loading coefficients via COE files</a:t>
+              <a:t>Testbench for Decimator and Interpolator with loading coefficients via COE files</a:t>
             </a:r>
             <a:endParaRPr lang="ru-RU" sz="1400" dirty="0"/>
           </a:p>
@@ -35103,11 +35067,7 @@
             <a:pPr algn="ctr"/>
             <a:r>
               <a:rPr lang="en-US" sz="1400" dirty="0" smtClean="0"/>
-              <a:t>Testbench for </a:t>
-            </a:r>
-            <a:r>
-              <a:rPr lang="en-US" sz="1400" dirty="0" smtClean="0"/>
-              <a:t>CIC Decimator and Interpolator</a:t>
+              <a:t>Testbench for CIC Decimator and Interpolator</a:t>
             </a:r>
             <a:endParaRPr lang="ru-RU" sz="1400" dirty="0"/>
           </a:p>
@@ -35399,7 +35359,11 @@
           <a:p>
             <a:r>
               <a:rPr lang="en-US" dirty="0" smtClean="0"/>
-              <a:t>FFT IP core: FFT + windowing</a:t>
+              <a:t>FFT IP core: </a:t>
+            </a:r>
+            <a:r>
+              <a:rPr lang="en-US" dirty="0" smtClean="0"/>
+              <a:t>FFT</a:t>
             </a:r>
             <a:endParaRPr lang="ru-RU" dirty="0"/>
           </a:p>
@@ -35507,7 +35471,11 @@
           <a:p>
             <a:r>
               <a:rPr lang="en-US" dirty="0" smtClean="0"/>
-              <a:t>FFT IP core: IFFT + windowing</a:t>
+              <a:t>FFT IP core: </a:t>
+            </a:r>
+            <a:r>
+              <a:rPr lang="en-US" dirty="0" smtClean="0"/>
+              <a:t>IFFT</a:t>
             </a:r>
             <a:endParaRPr lang="ru-RU" dirty="0"/>
           </a:p>

</xml_diff>